<commit_message>
Sort file as per requirement
</commit_message>
<xml_diff>
--- a/Presentation1.pptx
+++ b/Presentation1.pptx
@@ -5,15 +5,17 @@
     <p:sldMasterId id="2147483660" r:id="rId1"/>
   </p:sldMasterIdLst>
   <p:notesMasterIdLst>
-    <p:notesMasterId r:id="rId8"/>
+    <p:notesMasterId r:id="rId10"/>
   </p:notesMasterIdLst>
   <p:sldIdLst>
     <p:sldId id="257" r:id="rId2"/>
     <p:sldId id="258" r:id="rId3"/>
     <p:sldId id="259" r:id="rId4"/>
     <p:sldId id="260" r:id="rId5"/>
-    <p:sldId id="261" r:id="rId6"/>
-    <p:sldId id="262" r:id="rId7"/>
+    <p:sldId id="263" r:id="rId6"/>
+    <p:sldId id="261" r:id="rId7"/>
+    <p:sldId id="262" r:id="rId8"/>
+    <p:sldId id="264" r:id="rId9"/>
   </p:sldIdLst>
   <p:sldSz cx="12192000" cy="6858000"/>
   <p:notesSz cx="6858000" cy="9144000"/>
@@ -202,7 +204,7 @@
           <a:p>
             <a:fld id="{1068ABF7-A8BE-416A-A278-2661FE05E0EC}" type="datetimeFigureOut">
               <a:rPr lang="en-IN" smtClean="0"/>
-              <a:t>28-05-2021</a:t>
+              <a:t>31-05-2021</a:t>
             </a:fld>
             <a:endParaRPr lang="en-IN"/>
           </a:p>
@@ -641,7 +643,7 @@
           <a:p>
             <a:fld id="{F774550F-79BE-436A-BC84-146546EA91F6}" type="datetimeFigureOut">
               <a:rPr lang="en-IN" smtClean="0"/>
-              <a:t>28-05-2021</a:t>
+              <a:t>31-05-2021</a:t>
             </a:fld>
             <a:endParaRPr lang="en-IN"/>
           </a:p>
@@ -953,7 +955,7 @@
           <a:p>
             <a:fld id="{F774550F-79BE-436A-BC84-146546EA91F6}" type="datetimeFigureOut">
               <a:rPr lang="en-IN" smtClean="0"/>
-              <a:t>28-05-2021</a:t>
+              <a:t>31-05-2021</a:t>
             </a:fld>
             <a:endParaRPr lang="en-IN"/>
           </a:p>
@@ -1175,7 +1177,7 @@
           <a:p>
             <a:fld id="{F774550F-79BE-436A-BC84-146546EA91F6}" type="datetimeFigureOut">
               <a:rPr lang="en-IN" smtClean="0"/>
-              <a:t>28-05-2021</a:t>
+              <a:t>31-05-2021</a:t>
             </a:fld>
             <a:endParaRPr lang="en-IN"/>
           </a:p>
@@ -1466,7 +1468,7 @@
           <a:p>
             <a:fld id="{F774550F-79BE-436A-BC84-146546EA91F6}" type="datetimeFigureOut">
               <a:rPr lang="en-IN" smtClean="0"/>
-              <a:t>28-05-2021</a:t>
+              <a:t>31-05-2021</a:t>
             </a:fld>
             <a:endParaRPr lang="en-IN"/>
           </a:p>
@@ -1920,7 +1922,7 @@
           <a:p>
             <a:fld id="{F774550F-79BE-436A-BC84-146546EA91F6}" type="datetimeFigureOut">
               <a:rPr lang="en-IN" smtClean="0"/>
-              <a:t>28-05-2021</a:t>
+              <a:t>31-05-2021</a:t>
             </a:fld>
             <a:endParaRPr lang="en-IN"/>
           </a:p>
@@ -2496,7 +2498,7 @@
           <a:p>
             <a:fld id="{F774550F-79BE-436A-BC84-146546EA91F6}" type="datetimeFigureOut">
               <a:rPr lang="en-IN" smtClean="0"/>
-              <a:t>28-05-2021</a:t>
+              <a:t>31-05-2021</a:t>
             </a:fld>
             <a:endParaRPr lang="en-IN"/>
           </a:p>
@@ -3348,7 +3350,7 @@
           <a:p>
             <a:fld id="{F774550F-79BE-436A-BC84-146546EA91F6}" type="datetimeFigureOut">
               <a:rPr lang="en-IN" smtClean="0"/>
-              <a:t>28-05-2021</a:t>
+              <a:t>31-05-2021</a:t>
             </a:fld>
             <a:endParaRPr lang="en-IN"/>
           </a:p>
@@ -3553,7 +3555,7 @@
           <a:p>
             <a:fld id="{F774550F-79BE-436A-BC84-146546EA91F6}" type="datetimeFigureOut">
               <a:rPr lang="en-IN" smtClean="0"/>
-              <a:t>28-05-2021</a:t>
+              <a:t>31-05-2021</a:t>
             </a:fld>
             <a:endParaRPr lang="en-IN"/>
           </a:p>
@@ -3767,7 +3769,7 @@
           <a:p>
             <a:fld id="{F774550F-79BE-436A-BC84-146546EA91F6}" type="datetimeFigureOut">
               <a:rPr lang="en-IN" smtClean="0"/>
-              <a:t>28-05-2021</a:t>
+              <a:t>31-05-2021</a:t>
             </a:fld>
             <a:endParaRPr lang="en-IN"/>
           </a:p>
@@ -3955,7 +3957,7 @@
           <a:p>
             <a:fld id="{F774550F-79BE-436A-BC84-146546EA91F6}" type="datetimeFigureOut">
               <a:rPr lang="en-IN" smtClean="0"/>
-              <a:t>28-05-2021</a:t>
+              <a:t>31-05-2021</a:t>
             </a:fld>
             <a:endParaRPr lang="en-IN"/>
           </a:p>
@@ -4172,7 +4174,7 @@
           <a:p>
             <a:fld id="{F774550F-79BE-436A-BC84-146546EA91F6}" type="datetimeFigureOut">
               <a:rPr lang="en-IN" smtClean="0"/>
-              <a:t>28-05-2021</a:t>
+              <a:t>31-05-2021</a:t>
             </a:fld>
             <a:endParaRPr lang="en-IN"/>
           </a:p>
@@ -4452,7 +4454,7 @@
           <a:p>
             <a:fld id="{F774550F-79BE-436A-BC84-146546EA91F6}" type="datetimeFigureOut">
               <a:rPr lang="en-IN" smtClean="0"/>
-              <a:t>28-05-2021</a:t>
+              <a:t>31-05-2021</a:t>
             </a:fld>
             <a:endParaRPr lang="en-IN"/>
           </a:p>
@@ -4719,7 +4721,7 @@
           <a:p>
             <a:fld id="{F774550F-79BE-436A-BC84-146546EA91F6}" type="datetimeFigureOut">
               <a:rPr lang="en-IN" smtClean="0"/>
-              <a:t>28-05-2021</a:t>
+              <a:t>31-05-2021</a:t>
             </a:fld>
             <a:endParaRPr lang="en-IN"/>
           </a:p>
@@ -5134,7 +5136,7 @@
           <a:p>
             <a:fld id="{F774550F-79BE-436A-BC84-146546EA91F6}" type="datetimeFigureOut">
               <a:rPr lang="en-IN" smtClean="0"/>
-              <a:t>28-05-2021</a:t>
+              <a:t>31-05-2021</a:t>
             </a:fld>
             <a:endParaRPr lang="en-IN"/>
           </a:p>
@@ -5282,7 +5284,7 @@
           <a:p>
             <a:fld id="{F774550F-79BE-436A-BC84-146546EA91F6}" type="datetimeFigureOut">
               <a:rPr lang="en-IN" smtClean="0"/>
-              <a:t>28-05-2021</a:t>
+              <a:t>31-05-2021</a:t>
             </a:fld>
             <a:endParaRPr lang="en-IN"/>
           </a:p>
@@ -5407,7 +5409,7 @@
           <a:p>
             <a:fld id="{F774550F-79BE-436A-BC84-146546EA91F6}" type="datetimeFigureOut">
               <a:rPr lang="en-IN" smtClean="0"/>
-              <a:t>28-05-2021</a:t>
+              <a:t>31-05-2021</a:t>
             </a:fld>
             <a:endParaRPr lang="en-IN"/>
           </a:p>
@@ -5686,7 +5688,7 @@
           <a:p>
             <a:fld id="{F774550F-79BE-436A-BC84-146546EA91F6}" type="datetimeFigureOut">
               <a:rPr lang="en-IN" smtClean="0"/>
-              <a:t>28-05-2021</a:t>
+              <a:t>31-05-2021</a:t>
             </a:fld>
             <a:endParaRPr lang="en-IN"/>
           </a:p>
@@ -5998,7 +6000,7 @@
           <a:p>
             <a:fld id="{F774550F-79BE-436A-BC84-146546EA91F6}" type="datetimeFigureOut">
               <a:rPr lang="en-IN" smtClean="0"/>
-              <a:t>28-05-2021</a:t>
+              <a:t>31-05-2021</a:t>
             </a:fld>
             <a:endParaRPr lang="en-IN"/>
           </a:p>
@@ -6251,7 +6253,7 @@
           <a:p>
             <a:fld id="{F774550F-79BE-436A-BC84-146546EA91F6}" type="datetimeFigureOut">
               <a:rPr lang="en-IN" smtClean="0"/>
-              <a:t>28-05-2021</a:t>
+              <a:t>31-05-2021</a:t>
             </a:fld>
             <a:endParaRPr lang="en-IN"/>
           </a:p>
@@ -6826,6 +6828,147 @@
           <a:chExt cx="0" cy="0"/>
         </a:xfrm>
       </p:grpSpPr>
+      <p:sp>
+        <p:nvSpPr>
+          <p:cNvPr id="3" name="Content Placeholder 2">
+            <a:extLst>
+              <a:ext uri="{FF2B5EF4-FFF2-40B4-BE49-F238E27FC236}">
+                <a16:creationId xmlns:a16="http://schemas.microsoft.com/office/drawing/2014/main" id="{005CD9E4-2B35-4DCA-860C-7AE13CBD57C3}"/>
+              </a:ext>
+            </a:extLst>
+          </p:cNvPr>
+          <p:cNvSpPr>
+            <a:spLocks noGrp="1"/>
+          </p:cNvSpPr>
+          <p:nvPr>
+            <p:ph idx="1"/>
+          </p:nvPr>
+        </p:nvSpPr>
+        <p:spPr>
+          <a:xfrm>
+            <a:off x="838200" y="1322772"/>
+            <a:ext cx="10515600" cy="5170101"/>
+          </a:xfrm>
+        </p:spPr>
+        <p:txBody>
+          <a:bodyPr>
+            <a:normAutofit lnSpcReduction="10000"/>
+          </a:bodyPr>
+          <a:lstStyle/>
+          <a:p>
+            <a:pPr>
+              <a:buFont typeface="Wingdings" panose="05000000000000000000" pitchFamily="2" charset="2"/>
+              <a:buChar char="q"/>
+            </a:pPr>
+            <a:r>
+              <a:rPr lang="en-US" dirty="0"/>
+              <a:t>This is an Exploratory Data Analysis of the Zomato Dataset. Here, we'll look into the Zomato dataset, visualize it, discuss it, and try to find patterns, if any.</a:t>
+            </a:r>
+          </a:p>
+          <a:p>
+            <a:pPr>
+              <a:buFont typeface="Wingdings" panose="05000000000000000000" pitchFamily="2" charset="2"/>
+              <a:buChar char="q"/>
+            </a:pPr>
+            <a:r>
+              <a:rPr lang="en-US" dirty="0"/>
+              <a:t>The dataset has 7 columns and 2735 entries. There are 2 columns with float.</a:t>
+            </a:r>
+          </a:p>
+          <a:p>
+            <a:pPr>
+              <a:buFont typeface="Wingdings" panose="05000000000000000000" pitchFamily="2" charset="2"/>
+              <a:buChar char="q"/>
+            </a:pPr>
+            <a:r>
+              <a:rPr lang="en-US" dirty="0"/>
+              <a:t>Data contains following columns.</a:t>
+            </a:r>
+          </a:p>
+          <a:p>
+            <a:pPr>
+              <a:buFont typeface="Wingdings" panose="05000000000000000000" pitchFamily="2" charset="2"/>
+              <a:buChar char="Ø"/>
+            </a:pPr>
+            <a:r>
+              <a:rPr lang="en-US" dirty="0"/>
+              <a:t>Name</a:t>
+            </a:r>
+          </a:p>
+          <a:p>
+            <a:pPr>
+              <a:buFont typeface="Wingdings" panose="05000000000000000000" pitchFamily="2" charset="2"/>
+              <a:buChar char="Ø"/>
+            </a:pPr>
+            <a:r>
+              <a:rPr lang="en-US" dirty="0"/>
+              <a:t>Off</a:t>
+            </a:r>
+          </a:p>
+          <a:p>
+            <a:pPr>
+              <a:buFont typeface="Wingdings" panose="05000000000000000000" pitchFamily="2" charset="2"/>
+              <a:buChar char="Ø"/>
+            </a:pPr>
+            <a:r>
+              <a:rPr lang="en-US" dirty="0"/>
+              <a:t>Ratings</a:t>
+            </a:r>
+          </a:p>
+          <a:p>
+            <a:pPr>
+              <a:buFont typeface="Wingdings" panose="05000000000000000000" pitchFamily="2" charset="2"/>
+              <a:buChar char="Ø"/>
+            </a:pPr>
+            <a:r>
+              <a:rPr lang="en-US" dirty="0"/>
+              <a:t>Price for one</a:t>
+            </a:r>
+          </a:p>
+          <a:p>
+            <a:pPr>
+              <a:buFont typeface="Wingdings" panose="05000000000000000000" pitchFamily="2" charset="2"/>
+              <a:buChar char="Ø"/>
+            </a:pPr>
+            <a:r>
+              <a:rPr lang="en-US" dirty="0"/>
+              <a:t>Delivery Review</a:t>
+            </a:r>
+          </a:p>
+          <a:p>
+            <a:pPr>
+              <a:buFont typeface="Wingdings" panose="05000000000000000000" pitchFamily="2" charset="2"/>
+              <a:buChar char="Ø"/>
+            </a:pPr>
+            <a:r>
+              <a:rPr lang="en-US" dirty="0"/>
+              <a:t>Cuisine</a:t>
+            </a:r>
+          </a:p>
+          <a:p>
+            <a:pPr>
+              <a:buFont typeface="Wingdings" panose="05000000000000000000" pitchFamily="2" charset="2"/>
+              <a:buChar char="Ø"/>
+            </a:pPr>
+            <a:r>
+              <a:rPr lang="en-US" dirty="0"/>
+              <a:t>Location</a:t>
+            </a:r>
+          </a:p>
+          <a:p>
+            <a:pPr marL="0" indent="0">
+              <a:buNone/>
+            </a:pPr>
+            <a:endParaRPr lang="en-US" dirty="0"/>
+          </a:p>
+          <a:p>
+            <a:pPr marL="0" indent="0">
+              <a:buNone/>
+            </a:pPr>
+            <a:endParaRPr lang="en-US" dirty="0"/>
+          </a:p>
+        </p:txBody>
+      </p:sp>
       <p:pic>
         <p:nvPicPr>
           <p:cNvPr id="10" name="Picture 9">
@@ -6869,7 +7012,7 @@
         </p:blipFill>
         <p:spPr>
           <a:xfrm>
-            <a:off x="3506263" y="1743075"/>
+            <a:off x="5379451" y="2781763"/>
             <a:ext cx="5019675" cy="3371850"/>
           </a:xfrm>
           <a:prstGeom prst="roundRect">
@@ -6901,147 +7044,6 @@
           </a:sp3d>
         </p:spPr>
       </p:pic>
-      <p:sp>
-        <p:nvSpPr>
-          <p:cNvPr id="3" name="Content Placeholder 2">
-            <a:extLst>
-              <a:ext uri="{FF2B5EF4-FFF2-40B4-BE49-F238E27FC236}">
-                <a16:creationId xmlns:a16="http://schemas.microsoft.com/office/drawing/2014/main" id="{005CD9E4-2B35-4DCA-860C-7AE13CBD57C3}"/>
-              </a:ext>
-            </a:extLst>
-          </p:cNvPr>
-          <p:cNvSpPr>
-            <a:spLocks noGrp="1"/>
-          </p:cNvSpPr>
-          <p:nvPr>
-            <p:ph idx="1"/>
-          </p:nvPr>
-        </p:nvSpPr>
-        <p:spPr>
-          <a:xfrm>
-            <a:off x="838200" y="1322772"/>
-            <a:ext cx="10515600" cy="5170101"/>
-          </a:xfrm>
-        </p:spPr>
-        <p:txBody>
-          <a:bodyPr>
-            <a:normAutofit lnSpcReduction="10000"/>
-          </a:bodyPr>
-          <a:lstStyle/>
-          <a:p>
-            <a:pPr>
-              <a:buFont typeface="Wingdings" panose="05000000000000000000" pitchFamily="2" charset="2"/>
-              <a:buChar char="q"/>
-            </a:pPr>
-            <a:r>
-              <a:rPr lang="en-US" dirty="0"/>
-              <a:t>This is an Exploratory Data Analysis of the Zomato Dataset. Here, we'll look into the Zomato dataset, visualize it, discuss it, and try to find patterns, if any.</a:t>
-            </a:r>
-          </a:p>
-          <a:p>
-            <a:pPr>
-              <a:buFont typeface="Wingdings" panose="05000000000000000000" pitchFamily="2" charset="2"/>
-              <a:buChar char="q"/>
-            </a:pPr>
-            <a:r>
-              <a:rPr lang="en-US" dirty="0"/>
-              <a:t>The dataset has 7 columns and 2735 entries. There are 2 columns with float.</a:t>
-            </a:r>
-          </a:p>
-          <a:p>
-            <a:pPr>
-              <a:buFont typeface="Wingdings" panose="05000000000000000000" pitchFamily="2" charset="2"/>
-              <a:buChar char="q"/>
-            </a:pPr>
-            <a:r>
-              <a:rPr lang="en-US" dirty="0"/>
-              <a:t>Data contains following columns.</a:t>
-            </a:r>
-          </a:p>
-          <a:p>
-            <a:pPr>
-              <a:buFont typeface="Wingdings" panose="05000000000000000000" pitchFamily="2" charset="2"/>
-              <a:buChar char="Ø"/>
-            </a:pPr>
-            <a:r>
-              <a:rPr lang="en-US" dirty="0"/>
-              <a:t>Name</a:t>
-            </a:r>
-          </a:p>
-          <a:p>
-            <a:pPr>
-              <a:buFont typeface="Wingdings" panose="05000000000000000000" pitchFamily="2" charset="2"/>
-              <a:buChar char="Ø"/>
-            </a:pPr>
-            <a:r>
-              <a:rPr lang="en-US" dirty="0"/>
-              <a:t>Off</a:t>
-            </a:r>
-          </a:p>
-          <a:p>
-            <a:pPr>
-              <a:buFont typeface="Wingdings" panose="05000000000000000000" pitchFamily="2" charset="2"/>
-              <a:buChar char="Ø"/>
-            </a:pPr>
-            <a:r>
-              <a:rPr lang="en-US" dirty="0"/>
-              <a:t>Ratings</a:t>
-            </a:r>
-          </a:p>
-          <a:p>
-            <a:pPr>
-              <a:buFont typeface="Wingdings" panose="05000000000000000000" pitchFamily="2" charset="2"/>
-              <a:buChar char="Ø"/>
-            </a:pPr>
-            <a:r>
-              <a:rPr lang="en-US" dirty="0"/>
-              <a:t>Price for one</a:t>
-            </a:r>
-          </a:p>
-          <a:p>
-            <a:pPr>
-              <a:buFont typeface="Wingdings" panose="05000000000000000000" pitchFamily="2" charset="2"/>
-              <a:buChar char="Ø"/>
-            </a:pPr>
-            <a:r>
-              <a:rPr lang="en-US" dirty="0"/>
-              <a:t>Delivery Review</a:t>
-            </a:r>
-          </a:p>
-          <a:p>
-            <a:pPr>
-              <a:buFont typeface="Wingdings" panose="05000000000000000000" pitchFamily="2" charset="2"/>
-              <a:buChar char="Ø"/>
-            </a:pPr>
-            <a:r>
-              <a:rPr lang="en-US" dirty="0"/>
-              <a:t>Cuisine</a:t>
-            </a:r>
-          </a:p>
-          <a:p>
-            <a:pPr>
-              <a:buFont typeface="Wingdings" panose="05000000000000000000" pitchFamily="2" charset="2"/>
-              <a:buChar char="Ø"/>
-            </a:pPr>
-            <a:r>
-              <a:rPr lang="en-US" dirty="0"/>
-              <a:t>Location</a:t>
-            </a:r>
-          </a:p>
-          <a:p>
-            <a:pPr marL="0" indent="0">
-              <a:buNone/>
-            </a:pPr>
-            <a:endParaRPr lang="en-US" dirty="0"/>
-          </a:p>
-          <a:p>
-            <a:pPr marL="0" indent="0">
-              <a:buNone/>
-            </a:pPr>
-            <a:endParaRPr lang="en-US" dirty="0"/>
-          </a:p>
-        </p:txBody>
-      </p:sp>
       <p:sp>
         <p:nvSpPr>
           <p:cNvPr id="2" name="Title 1">
@@ -7211,36 +7213,6 @@
           </a:p>
         </p:txBody>
       </p:sp>
-      <p:pic>
-        <p:nvPicPr>
-          <p:cNvPr id="5" name="Picture 4">
-            <a:extLst>
-              <a:ext uri="{FF2B5EF4-FFF2-40B4-BE49-F238E27FC236}">
-                <a16:creationId xmlns:a16="http://schemas.microsoft.com/office/drawing/2014/main" id="{69CF09AC-A903-454E-B380-84F81ABE9BB1}"/>
-              </a:ext>
-            </a:extLst>
-          </p:cNvPr>
-          <p:cNvPicPr>
-            <a:picLocks noChangeAspect="1"/>
-          </p:cNvPicPr>
-          <p:nvPr/>
-        </p:nvPicPr>
-        <p:blipFill>
-          <a:blip r:embed="rId3"/>
-          <a:stretch>
-            <a:fillRect/>
-          </a:stretch>
-        </p:blipFill>
-        <p:spPr>
-          <a:xfrm>
-            <a:off x="5993352" y="1740808"/>
-            <a:ext cx="5372100" cy="4352925"/>
-          </a:xfrm>
-          <a:prstGeom prst="rect">
-            <a:avLst/>
-          </a:prstGeom>
-        </p:spPr>
-      </p:pic>
       <p:sp>
         <p:nvSpPr>
           <p:cNvPr id="6" name="TextBox 5">
@@ -7256,7 +7228,7 @@
         <p:spPr>
           <a:xfrm>
             <a:off x="525754" y="667577"/>
-            <a:ext cx="4260846" cy="1200329"/>
+            <a:ext cx="4003019" cy="1200329"/>
           </a:xfrm>
           <a:prstGeom prst="rect">
             <a:avLst/>
@@ -7270,7 +7242,11 @@
           <a:lstStyle/>
           <a:p>
             <a:r>
-              <a:rPr lang="en-IN" sz="7200" dirty="0"/>
+              <a:rPr lang="en-IN" sz="7200" dirty="0">
+                <a:solidFill>
+                  <a:schemeClr val="accent6"/>
+                </a:solidFill>
+              </a:rPr>
               <a:t>Locations:-</a:t>
             </a:r>
           </a:p>
@@ -7507,6 +7483,36 @@
           </a:p>
         </p:txBody>
       </p:sp>
+      <p:pic>
+        <p:nvPicPr>
+          <p:cNvPr id="8" name="Picture 7">
+            <a:extLst>
+              <a:ext uri="{FF2B5EF4-FFF2-40B4-BE49-F238E27FC236}">
+                <a16:creationId xmlns:a16="http://schemas.microsoft.com/office/drawing/2014/main" id="{617BFF46-0AC7-43DE-AA08-DB473D46EEEA}"/>
+              </a:ext>
+            </a:extLst>
+          </p:cNvPr>
+          <p:cNvPicPr>
+            <a:picLocks noChangeAspect="1"/>
+          </p:cNvPicPr>
+          <p:nvPr/>
+        </p:nvPicPr>
+        <p:blipFill>
+          <a:blip r:embed="rId3"/>
+          <a:stretch>
+            <a:fillRect/>
+          </a:stretch>
+        </p:blipFill>
+        <p:spPr>
+          <a:xfrm>
+            <a:off x="5528818" y="778137"/>
+            <a:ext cx="5722334" cy="4619233"/>
+          </a:xfrm>
+          <a:prstGeom prst="rect">
+            <a:avLst/>
+          </a:prstGeom>
+        </p:spPr>
+      </p:pic>
     </p:spTree>
     <p:extLst>
       <p:ext uri="{BB962C8B-B14F-4D97-AF65-F5344CB8AC3E}">
@@ -7979,6 +7985,133 @@
           <a:chExt cx="0" cy="0"/>
         </a:xfrm>
       </p:grpSpPr>
+      <p:pic>
+        <p:nvPicPr>
+          <p:cNvPr id="5" name="Picture 4">
+            <a:extLst>
+              <a:ext uri="{FF2B5EF4-FFF2-40B4-BE49-F238E27FC236}">
+                <a16:creationId xmlns:a16="http://schemas.microsoft.com/office/drawing/2014/main" id="{28E4A294-BA76-485D-8459-17D5CF429423}"/>
+              </a:ext>
+            </a:extLst>
+          </p:cNvPr>
+          <p:cNvPicPr>
+            <a:picLocks noChangeAspect="1"/>
+          </p:cNvPicPr>
+          <p:nvPr/>
+        </p:nvPicPr>
+        <p:blipFill>
+          <a:blip r:embed="rId2"/>
+          <a:stretch>
+            <a:fillRect/>
+          </a:stretch>
+        </p:blipFill>
+        <p:spPr>
+          <a:xfrm>
+            <a:off x="0" y="156237"/>
+            <a:ext cx="11627759" cy="6442078"/>
+          </a:xfrm>
+          <a:prstGeom prst="rect">
+            <a:avLst/>
+          </a:prstGeom>
+        </p:spPr>
+      </p:pic>
+      <p:pic>
+        <p:nvPicPr>
+          <p:cNvPr id="6" name="Picture 5">
+            <a:extLst>
+              <a:ext uri="{FF2B5EF4-FFF2-40B4-BE49-F238E27FC236}">
+                <a16:creationId xmlns:a16="http://schemas.microsoft.com/office/drawing/2014/main" id="{1FEB2B89-EF42-45AC-99E2-86AAE283A1D7}"/>
+              </a:ext>
+            </a:extLst>
+          </p:cNvPr>
+          <p:cNvPicPr>
+            <a:picLocks noChangeAspect="1"/>
+          </p:cNvPicPr>
+          <p:nvPr/>
+        </p:nvPicPr>
+        <p:blipFill>
+          <a:blip r:embed="rId3">
+            <a:duotone>
+              <a:schemeClr val="accent6">
+                <a:shade val="45000"/>
+                <a:satMod val="135000"/>
+              </a:schemeClr>
+              <a:prstClr val="white"/>
+            </a:duotone>
+            <a:extLst>
+              <a:ext uri="{28A0092B-C50C-407E-A947-70E740481C1C}">
+                <a14:useLocalDpi xmlns:a14="http://schemas.microsoft.com/office/drawing/2010/main" val="0"/>
+              </a:ext>
+            </a:extLst>
+          </a:blip>
+          <a:stretch>
+            <a:fillRect/>
+          </a:stretch>
+        </p:blipFill>
+        <p:spPr>
+          <a:xfrm>
+            <a:off x="1082891" y="1088785"/>
+            <a:ext cx="4298052" cy="3726503"/>
+          </a:xfrm>
+          <a:prstGeom prst="roundRect">
+            <a:avLst>
+              <a:gd name="adj" fmla="val 16667"/>
+            </a:avLst>
+          </a:prstGeom>
+          <a:ln>
+            <a:noFill/>
+          </a:ln>
+          <a:effectLst>
+            <a:outerShdw blurRad="152400" dist="12000" dir="900000" sy="98000" kx="110000" ky="200000" algn="tl" rotWithShape="0">
+              <a:srgbClr val="000000">
+                <a:alpha val="30000"/>
+              </a:srgbClr>
+            </a:outerShdw>
+          </a:effectLst>
+          <a:scene3d>
+            <a:camera prst="perspectiveRelaxed">
+              <a:rot lat="19800000" lon="1200000" rev="20820000"/>
+            </a:camera>
+            <a:lightRig rig="threePt" dir="t"/>
+          </a:scene3d>
+          <a:sp3d contourW="6350" prstMaterial="matte">
+            <a:bevelT w="101600" h="101600"/>
+            <a:contourClr>
+              <a:srgbClr val="969696"/>
+            </a:contourClr>
+          </a:sp3d>
+        </p:spPr>
+      </p:pic>
+    </p:spTree>
+    <p:extLst>
+      <p:ext uri="{BB962C8B-B14F-4D97-AF65-F5344CB8AC3E}">
+        <p14:creationId xmlns:p14="http://schemas.microsoft.com/office/powerpoint/2010/main" val="1427351797"/>
+      </p:ext>
+    </p:extLst>
+  </p:cSld>
+  <p:clrMapOvr>
+    <a:masterClrMapping/>
+  </p:clrMapOvr>
+</p:sld>
+</file>
+
+<file path=ppt/slides/slide6.xml><?xml version="1.0" encoding="utf-8"?>
+<p:sld xmlns:a="http://schemas.openxmlformats.org/drawingml/2006/main" xmlns:r="http://schemas.openxmlformats.org/officeDocument/2006/relationships" xmlns:p="http://schemas.openxmlformats.org/presentationml/2006/main">
+  <p:cSld>
+    <p:spTree>
+      <p:nvGrpSpPr>
+        <p:cNvPr id="1" name=""/>
+        <p:cNvGrpSpPr/>
+        <p:nvPr/>
+      </p:nvGrpSpPr>
+      <p:grpSpPr>
+        <a:xfrm>
+          <a:off x="0" y="0"/>
+          <a:ext cx="0" cy="0"/>
+          <a:chOff x="0" y="0"/>
+          <a:chExt cx="0" cy="0"/>
+        </a:xfrm>
+      </p:grpSpPr>
       <p:sp>
         <p:nvSpPr>
           <p:cNvPr id="6" name="TextBox 5">
@@ -8080,7 +8213,7 @@
         </p:blipFill>
         <p:spPr>
           <a:xfrm>
-            <a:off x="5348426" y="605254"/>
+            <a:off x="5277405" y="1065320"/>
             <a:ext cx="4495800" cy="5267325"/>
           </a:xfrm>
           <a:prstGeom prst="rect">
@@ -8101,7 +8234,7 @@
 </p:sld>
 </file>
 
-<file path=ppt/slides/slide6.xml><?xml version="1.0" encoding="utf-8"?>
+<file path=ppt/slides/slide7.xml><?xml version="1.0" encoding="utf-8"?>
 <p:sld xmlns:a="http://schemas.openxmlformats.org/drawingml/2006/main" xmlns:r="http://schemas.openxmlformats.org/officeDocument/2006/relationships" xmlns:p="http://schemas.openxmlformats.org/presentationml/2006/main">
   <p:cSld>
     <p:spTree>
@@ -8152,6 +8285,66 @@
     <p:extLst>
       <p:ext uri="{BB962C8B-B14F-4D97-AF65-F5344CB8AC3E}">
         <p14:creationId xmlns:p14="http://schemas.microsoft.com/office/powerpoint/2010/main" val="2445670713"/>
+      </p:ext>
+    </p:extLst>
+  </p:cSld>
+  <p:clrMapOvr>
+    <a:masterClrMapping/>
+  </p:clrMapOvr>
+</p:sld>
+</file>
+
+<file path=ppt/slides/slide8.xml><?xml version="1.0" encoding="utf-8"?>
+<p:sld xmlns:a="http://schemas.openxmlformats.org/drawingml/2006/main" xmlns:r="http://schemas.openxmlformats.org/officeDocument/2006/relationships" xmlns:p="http://schemas.openxmlformats.org/presentationml/2006/main">
+  <p:cSld>
+    <p:spTree>
+      <p:nvGrpSpPr>
+        <p:cNvPr id="1" name=""/>
+        <p:cNvGrpSpPr/>
+        <p:nvPr/>
+      </p:nvGrpSpPr>
+      <p:grpSpPr>
+        <a:xfrm>
+          <a:off x="0" y="0"/>
+          <a:ext cx="0" cy="0"/>
+          <a:chOff x="0" y="0"/>
+          <a:chExt cx="0" cy="0"/>
+        </a:xfrm>
+      </p:grpSpPr>
+      <p:pic>
+        <p:nvPicPr>
+          <p:cNvPr id="4" name="Picture 3">
+            <a:extLst>
+              <a:ext uri="{FF2B5EF4-FFF2-40B4-BE49-F238E27FC236}">
+                <a16:creationId xmlns:a16="http://schemas.microsoft.com/office/drawing/2014/main" id="{2713A7F3-E6A4-435F-A4AA-8FD2D88930FB}"/>
+              </a:ext>
+            </a:extLst>
+          </p:cNvPr>
+          <p:cNvPicPr>
+            <a:picLocks noChangeAspect="1"/>
+          </p:cNvPicPr>
+          <p:nvPr/>
+        </p:nvPicPr>
+        <p:blipFill>
+          <a:blip r:embed="rId2"/>
+          <a:stretch>
+            <a:fillRect/>
+          </a:stretch>
+        </p:blipFill>
+        <p:spPr>
+          <a:xfrm>
+            <a:off x="1044606" y="446103"/>
+            <a:ext cx="10102788" cy="5965794"/>
+          </a:xfrm>
+          <a:prstGeom prst="rect">
+            <a:avLst/>
+          </a:prstGeom>
+        </p:spPr>
+      </p:pic>
+    </p:spTree>
+    <p:extLst>
+      <p:ext uri="{BB962C8B-B14F-4D97-AF65-F5344CB8AC3E}">
+        <p14:creationId xmlns:p14="http://schemas.microsoft.com/office/powerpoint/2010/main" val="1160455095"/>
       </p:ext>
     </p:extLst>
   </p:cSld>

</xml_diff>